<commit_message>
Updating lecture notes / lab 1 grading script.
</commit_message>
<xml_diff>
--- a/01_27_2025/CSCI391_Microservices_HowToModelMicroservices_01_27_2025.pptx
+++ b/01_27_2025/CSCI391_Microservices_HowToModelMicroservices_01_27_2025.pptx
@@ -15,6 +15,12 @@
     <p:sldId id="263" r:id="rId9"/>
     <p:sldId id="264" r:id="rId10"/>
     <p:sldId id="265" r:id="rId11"/>
+    <p:sldId id="266" r:id="rId12"/>
+    <p:sldId id="267" r:id="rId13"/>
+    <p:sldId id="268" r:id="rId14"/>
+    <p:sldId id="269" r:id="rId15"/>
+    <p:sldId id="270" r:id="rId16"/>
+    <p:sldId id="271" r:id="rId17"/>
   </p:sldIdLst>
   <p:sldSz cx="12192000" cy="6858000"/>
   <p:notesSz cx="6858000" cy="9144000"/>
@@ -113,6 +119,11 @@
       </a:defRPr>
     </a:lvl9pPr>
   </p:defaultTextStyle>
+  <p:extLst>
+    <p:ext uri="{EFAFB233-063F-42B5-8137-9DF3F51BA10A}">
+      <p15:sldGuideLst xmlns:p15="http://schemas.microsoft.com/office/powerpoint/2012/main"/>
+    </p:ext>
+  </p:extLst>
 </p:presentation>
 </file>
 
@@ -263,7 +274,7 @@
           <a:p>
             <a:fld id="{B4572089-FD2C-480D-9A68-C7F392415A10}" type="datetimeFigureOut">
               <a:rPr lang="en-US" smtClean="0"/>
-              <a:t>1/27/2025</a:t>
+              <a:t>1/28/2025</a:t>
             </a:fld>
             <a:endParaRPr lang="en-US"/>
           </a:p>
@@ -461,7 +472,7 @@
           <a:p>
             <a:fld id="{B4572089-FD2C-480D-9A68-C7F392415A10}" type="datetimeFigureOut">
               <a:rPr lang="en-US" smtClean="0"/>
-              <a:t>1/27/2025</a:t>
+              <a:t>1/28/2025</a:t>
             </a:fld>
             <a:endParaRPr lang="en-US"/>
           </a:p>
@@ -669,7 +680,7 @@
           <a:p>
             <a:fld id="{B4572089-FD2C-480D-9A68-C7F392415A10}" type="datetimeFigureOut">
               <a:rPr lang="en-US" smtClean="0"/>
-              <a:t>1/27/2025</a:t>
+              <a:t>1/28/2025</a:t>
             </a:fld>
             <a:endParaRPr lang="en-US"/>
           </a:p>
@@ -867,7 +878,7 @@
           <a:p>
             <a:fld id="{B4572089-FD2C-480D-9A68-C7F392415A10}" type="datetimeFigureOut">
               <a:rPr lang="en-US" smtClean="0"/>
-              <a:t>1/27/2025</a:t>
+              <a:t>1/28/2025</a:t>
             </a:fld>
             <a:endParaRPr lang="en-US"/>
           </a:p>
@@ -1142,7 +1153,7 @@
           <a:p>
             <a:fld id="{B4572089-FD2C-480D-9A68-C7F392415A10}" type="datetimeFigureOut">
               <a:rPr lang="en-US" smtClean="0"/>
-              <a:t>1/27/2025</a:t>
+              <a:t>1/28/2025</a:t>
             </a:fld>
             <a:endParaRPr lang="en-US"/>
           </a:p>
@@ -1407,7 +1418,7 @@
           <a:p>
             <a:fld id="{B4572089-FD2C-480D-9A68-C7F392415A10}" type="datetimeFigureOut">
               <a:rPr lang="en-US" smtClean="0"/>
-              <a:t>1/27/2025</a:t>
+              <a:t>1/28/2025</a:t>
             </a:fld>
             <a:endParaRPr lang="en-US"/>
           </a:p>
@@ -1819,7 +1830,7 @@
           <a:p>
             <a:fld id="{B4572089-FD2C-480D-9A68-C7F392415A10}" type="datetimeFigureOut">
               <a:rPr lang="en-US" smtClean="0"/>
-              <a:t>1/27/2025</a:t>
+              <a:t>1/28/2025</a:t>
             </a:fld>
             <a:endParaRPr lang="en-US"/>
           </a:p>
@@ -1960,7 +1971,7 @@
           <a:p>
             <a:fld id="{B4572089-FD2C-480D-9A68-C7F392415A10}" type="datetimeFigureOut">
               <a:rPr lang="en-US" smtClean="0"/>
-              <a:t>1/27/2025</a:t>
+              <a:t>1/28/2025</a:t>
             </a:fld>
             <a:endParaRPr lang="en-US"/>
           </a:p>
@@ -2073,7 +2084,7 @@
           <a:p>
             <a:fld id="{B4572089-FD2C-480D-9A68-C7F392415A10}" type="datetimeFigureOut">
               <a:rPr lang="en-US" smtClean="0"/>
-              <a:t>1/27/2025</a:t>
+              <a:t>1/28/2025</a:t>
             </a:fld>
             <a:endParaRPr lang="en-US"/>
           </a:p>
@@ -2384,7 +2395,7 @@
           <a:p>
             <a:fld id="{B4572089-FD2C-480D-9A68-C7F392415A10}" type="datetimeFigureOut">
               <a:rPr lang="en-US" smtClean="0"/>
-              <a:t>1/27/2025</a:t>
+              <a:t>1/28/2025</a:t>
             </a:fld>
             <a:endParaRPr lang="en-US"/>
           </a:p>
@@ -2672,7 +2683,7 @@
           <a:p>
             <a:fld id="{B4572089-FD2C-480D-9A68-C7F392415A10}" type="datetimeFigureOut">
               <a:rPr lang="en-US" smtClean="0"/>
-              <a:t>1/27/2025</a:t>
+              <a:t>1/28/2025</a:t>
             </a:fld>
             <a:endParaRPr lang="en-US"/>
           </a:p>
@@ -2913,7 +2924,7 @@
           <a:p>
             <a:fld id="{B4572089-FD2C-480D-9A68-C7F392415A10}" type="datetimeFigureOut">
               <a:rPr lang="en-US" smtClean="0"/>
-              <a:t>1/27/2025</a:t>
+              <a:t>1/28/2025</a:t>
             </a:fld>
             <a:endParaRPr lang="en-US"/>
           </a:p>
@@ -3808,6 +3819,1927 @@
 </p:sld>
 </file>
 
+<file path=ppt/slides/slide11.xml><?xml version="1.0" encoding="utf-8"?>
+<p:sld xmlns:a="http://schemas.openxmlformats.org/drawingml/2006/main" xmlns:r="http://schemas.openxmlformats.org/officeDocument/2006/relationships" xmlns:p="http://schemas.openxmlformats.org/presentationml/2006/main">
+  <p:cSld>
+    <p:spTree>
+      <p:nvGrpSpPr>
+        <p:cNvPr id="1" name=""/>
+        <p:cNvGrpSpPr/>
+        <p:nvPr/>
+      </p:nvGrpSpPr>
+      <p:grpSpPr>
+        <a:xfrm>
+          <a:off x="0" y="0"/>
+          <a:ext cx="0" cy="0"/>
+          <a:chOff x="0" y="0"/>
+          <a:chExt cx="0" cy="0"/>
+        </a:xfrm>
+      </p:grpSpPr>
+      <p:sp>
+        <p:nvSpPr>
+          <p:cNvPr id="5" name="TextBox 4">
+            <a:extLst>
+              <a:ext uri="{FF2B5EF4-FFF2-40B4-BE49-F238E27FC236}">
+                <a16:creationId xmlns:a16="http://schemas.microsoft.com/office/drawing/2014/main" id="{60B6CCF9-DC47-96E7-F5A5-6B6122F6BDDC}"/>
+              </a:ext>
+            </a:extLst>
+          </p:cNvPr>
+          <p:cNvSpPr txBox="1"/>
+          <p:nvPr/>
+        </p:nvSpPr>
+        <p:spPr>
+          <a:xfrm>
+            <a:off x="534879" y="423454"/>
+            <a:ext cx="6094520" cy="369332"/>
+          </a:xfrm>
+          <a:prstGeom prst="rect">
+            <a:avLst/>
+          </a:prstGeom>
+          <a:noFill/>
+        </p:spPr>
+        <p:txBody>
+          <a:bodyPr wrap="square">
+            <a:spAutoFit/>
+          </a:bodyPr>
+          <a:lstStyle/>
+          <a:p>
+            <a:r>
+              <a:rPr lang="en-US" sz="1800" b="1" i="0" u="none" strike="noStrike" baseline="0" dirty="0">
+                <a:latin typeface="LiberationSans-Bold"/>
+              </a:rPr>
+              <a:t>Pass-Through Coupling</a:t>
+            </a:r>
+            <a:endParaRPr lang="en-US" dirty="0"/>
+          </a:p>
+        </p:txBody>
+      </p:sp>
+      <p:sp>
+        <p:nvSpPr>
+          <p:cNvPr id="7" name="TextBox 6">
+            <a:extLst>
+              <a:ext uri="{FF2B5EF4-FFF2-40B4-BE49-F238E27FC236}">
+                <a16:creationId xmlns:a16="http://schemas.microsoft.com/office/drawing/2014/main" id="{EDB17C8D-2435-0DC4-63D7-8E32C64928F1}"/>
+              </a:ext>
+            </a:extLst>
+          </p:cNvPr>
+          <p:cNvSpPr txBox="1"/>
+          <p:nvPr/>
+        </p:nvSpPr>
+        <p:spPr>
+          <a:xfrm>
+            <a:off x="534879" y="792786"/>
+            <a:ext cx="6094520" cy="923330"/>
+          </a:xfrm>
+          <a:prstGeom prst="rect">
+            <a:avLst/>
+          </a:prstGeom>
+          <a:noFill/>
+        </p:spPr>
+        <p:txBody>
+          <a:bodyPr wrap="square">
+            <a:spAutoFit/>
+          </a:bodyPr>
+          <a:lstStyle/>
+          <a:p>
+            <a:pPr algn="l"/>
+            <a:r>
+              <a:rPr lang="en-US" sz="1800" b="0" i="0" u="none" strike="noStrike" baseline="0" dirty="0">
+                <a:latin typeface="LiberationSerif"/>
+              </a:rPr>
+              <a:t>one microservice passes data to another microservice purely because the data is needed by some other microservice further downstream.</a:t>
+            </a:r>
+            <a:endParaRPr lang="en-US" dirty="0"/>
+          </a:p>
+        </p:txBody>
+      </p:sp>
+      <p:pic>
+        <p:nvPicPr>
+          <p:cNvPr id="9" name="Picture 8">
+            <a:extLst>
+              <a:ext uri="{FF2B5EF4-FFF2-40B4-BE49-F238E27FC236}">
+                <a16:creationId xmlns:a16="http://schemas.microsoft.com/office/drawing/2014/main" id="{6475B593-97E4-D6AE-4F52-FFFBADB7E83F}"/>
+              </a:ext>
+            </a:extLst>
+          </p:cNvPr>
+          <p:cNvPicPr>
+            <a:picLocks noChangeAspect="1"/>
+          </p:cNvPicPr>
+          <p:nvPr/>
+        </p:nvPicPr>
+        <p:blipFill>
+          <a:blip r:embed="rId2"/>
+          <a:stretch>
+            <a:fillRect/>
+          </a:stretch>
+        </p:blipFill>
+        <p:spPr>
+          <a:xfrm>
+            <a:off x="534879" y="2085448"/>
+            <a:ext cx="5715000" cy="2609850"/>
+          </a:xfrm>
+          <a:prstGeom prst="rect">
+            <a:avLst/>
+          </a:prstGeom>
+        </p:spPr>
+      </p:pic>
+      <p:sp>
+        <p:nvSpPr>
+          <p:cNvPr id="11" name="TextBox 10">
+            <a:extLst>
+              <a:ext uri="{FF2B5EF4-FFF2-40B4-BE49-F238E27FC236}">
+                <a16:creationId xmlns:a16="http://schemas.microsoft.com/office/drawing/2014/main" id="{54F9F7DE-96AB-0054-0B67-F1330F05205E}"/>
+              </a:ext>
+            </a:extLst>
+          </p:cNvPr>
+          <p:cNvSpPr txBox="1"/>
+          <p:nvPr/>
+        </p:nvSpPr>
+        <p:spPr>
+          <a:xfrm>
+            <a:off x="534879" y="5064630"/>
+            <a:ext cx="6096000" cy="646331"/>
+          </a:xfrm>
+          <a:prstGeom prst="rect">
+            <a:avLst/>
+          </a:prstGeom>
+          <a:noFill/>
+        </p:spPr>
+        <p:txBody>
+          <a:bodyPr wrap="square">
+            <a:spAutoFit/>
+          </a:bodyPr>
+          <a:lstStyle/>
+          <a:p>
+            <a:pPr algn="l"/>
+            <a:r>
+              <a:rPr lang="en-US" sz="1800" b="0" i="0" u="none" strike="noStrike" baseline="0" dirty="0">
+                <a:latin typeface="LiberationSerif"/>
+              </a:rPr>
+              <a:t>a change to the required data</a:t>
+            </a:r>
+          </a:p>
+          <a:p>
+            <a:pPr algn="l"/>
+            <a:r>
+              <a:rPr lang="en-US" sz="1800" b="0" i="0" u="none" strike="noStrike" baseline="0" dirty="0">
+                <a:latin typeface="LiberationSerif"/>
+              </a:rPr>
+              <a:t>downstream can cause a more significant upstream change.</a:t>
+            </a:r>
+            <a:endParaRPr lang="en-US" dirty="0"/>
+          </a:p>
+        </p:txBody>
+      </p:sp>
+    </p:spTree>
+    <p:extLst>
+      <p:ext uri="{BB962C8B-B14F-4D97-AF65-F5344CB8AC3E}">
+        <p14:creationId xmlns:p14="http://schemas.microsoft.com/office/powerpoint/2010/main" val="3393892169"/>
+      </p:ext>
+    </p:extLst>
+  </p:cSld>
+  <p:clrMapOvr>
+    <a:masterClrMapping/>
+  </p:clrMapOvr>
+</p:sld>
+</file>
+
+<file path=ppt/slides/slide12.xml><?xml version="1.0" encoding="utf-8"?>
+<p:sld xmlns:a="http://schemas.openxmlformats.org/drawingml/2006/main" xmlns:r="http://schemas.openxmlformats.org/officeDocument/2006/relationships" xmlns:p="http://schemas.openxmlformats.org/presentationml/2006/main">
+  <p:cSld>
+    <p:spTree>
+      <p:nvGrpSpPr>
+        <p:cNvPr id="1" name=""/>
+        <p:cNvGrpSpPr/>
+        <p:nvPr/>
+      </p:nvGrpSpPr>
+      <p:grpSpPr>
+        <a:xfrm>
+          <a:off x="0" y="0"/>
+          <a:ext cx="0" cy="0"/>
+          <a:chOff x="0" y="0"/>
+          <a:chExt cx="0" cy="0"/>
+        </a:xfrm>
+      </p:grpSpPr>
+      <p:sp>
+        <p:nvSpPr>
+          <p:cNvPr id="4" name="TextBox 3">
+            <a:extLst>
+              <a:ext uri="{FF2B5EF4-FFF2-40B4-BE49-F238E27FC236}">
+                <a16:creationId xmlns:a16="http://schemas.microsoft.com/office/drawing/2014/main" id="{06682F96-522B-2353-BDA0-702EE1BF35AA}"/>
+              </a:ext>
+            </a:extLst>
+          </p:cNvPr>
+          <p:cNvSpPr txBox="1"/>
+          <p:nvPr/>
+        </p:nvSpPr>
+        <p:spPr>
+          <a:xfrm>
+            <a:off x="534879" y="423454"/>
+            <a:ext cx="6094520" cy="369332"/>
+          </a:xfrm>
+          <a:prstGeom prst="rect">
+            <a:avLst/>
+          </a:prstGeom>
+          <a:noFill/>
+        </p:spPr>
+        <p:txBody>
+          <a:bodyPr wrap="square">
+            <a:spAutoFit/>
+          </a:bodyPr>
+          <a:lstStyle/>
+          <a:p>
+            <a:r>
+              <a:rPr lang="en-US" b="1" dirty="0">
+                <a:latin typeface="LiberationSans-Bold"/>
+              </a:rPr>
+              <a:t>Solution 1</a:t>
+            </a:r>
+            <a:endParaRPr lang="en-US" dirty="0"/>
+          </a:p>
+        </p:txBody>
+      </p:sp>
+      <p:sp>
+        <p:nvSpPr>
+          <p:cNvPr id="6" name="TextBox 5">
+            <a:extLst>
+              <a:ext uri="{FF2B5EF4-FFF2-40B4-BE49-F238E27FC236}">
+                <a16:creationId xmlns:a16="http://schemas.microsoft.com/office/drawing/2014/main" id="{4013D922-2483-8144-2611-CF105EDCF0EB}"/>
+              </a:ext>
+            </a:extLst>
+          </p:cNvPr>
+          <p:cNvSpPr txBox="1"/>
+          <p:nvPr/>
+        </p:nvSpPr>
+        <p:spPr>
+          <a:xfrm>
+            <a:off x="534879" y="792786"/>
+            <a:ext cx="6094520" cy="369332"/>
+          </a:xfrm>
+          <a:prstGeom prst="rect">
+            <a:avLst/>
+          </a:prstGeom>
+          <a:noFill/>
+        </p:spPr>
+        <p:txBody>
+          <a:bodyPr wrap="square">
+            <a:spAutoFit/>
+          </a:bodyPr>
+          <a:lstStyle/>
+          <a:p>
+            <a:r>
+              <a:rPr lang="en-US" sz="1800" b="0" i="0" u="none" strike="noStrike" baseline="0" dirty="0">
+                <a:latin typeface="LiberationSerif"/>
+              </a:rPr>
+              <a:t>calling microservice to just bypass the intermediary</a:t>
+            </a:r>
+            <a:endParaRPr lang="en-US" dirty="0"/>
+          </a:p>
+        </p:txBody>
+      </p:sp>
+      <p:pic>
+        <p:nvPicPr>
+          <p:cNvPr id="8" name="Picture 7">
+            <a:extLst>
+              <a:ext uri="{FF2B5EF4-FFF2-40B4-BE49-F238E27FC236}">
+                <a16:creationId xmlns:a16="http://schemas.microsoft.com/office/drawing/2014/main" id="{55871F3E-6260-941B-E6E1-4123855AFB08}"/>
+              </a:ext>
+            </a:extLst>
+          </p:cNvPr>
+          <p:cNvPicPr>
+            <a:picLocks noChangeAspect="1"/>
+          </p:cNvPicPr>
+          <p:nvPr/>
+        </p:nvPicPr>
+        <p:blipFill>
+          <a:blip r:embed="rId2"/>
+          <a:stretch>
+            <a:fillRect/>
+          </a:stretch>
+        </p:blipFill>
+        <p:spPr>
+          <a:xfrm>
+            <a:off x="534879" y="1527063"/>
+            <a:ext cx="5715000" cy="4352925"/>
+          </a:xfrm>
+          <a:prstGeom prst="rect">
+            <a:avLst/>
+          </a:prstGeom>
+        </p:spPr>
+      </p:pic>
+    </p:spTree>
+    <p:extLst>
+      <p:ext uri="{BB962C8B-B14F-4D97-AF65-F5344CB8AC3E}">
+        <p14:creationId xmlns:p14="http://schemas.microsoft.com/office/powerpoint/2010/main" val="1943327811"/>
+      </p:ext>
+    </p:extLst>
+  </p:cSld>
+  <p:clrMapOvr>
+    <a:masterClrMapping/>
+  </p:clrMapOvr>
+</p:sld>
+</file>
+
+<file path=ppt/slides/slide13.xml><?xml version="1.0" encoding="utf-8"?>
+<p:sld xmlns:a="http://schemas.openxmlformats.org/drawingml/2006/main" xmlns:r="http://schemas.openxmlformats.org/officeDocument/2006/relationships" xmlns:p="http://schemas.openxmlformats.org/presentationml/2006/main">
+  <p:cSld>
+    <p:spTree>
+      <p:nvGrpSpPr>
+        <p:cNvPr id="1" name=""/>
+        <p:cNvGrpSpPr/>
+        <p:nvPr/>
+      </p:nvGrpSpPr>
+      <p:grpSpPr>
+        <a:xfrm>
+          <a:off x="0" y="0"/>
+          <a:ext cx="0" cy="0"/>
+          <a:chOff x="0" y="0"/>
+          <a:chExt cx="0" cy="0"/>
+        </a:xfrm>
+      </p:grpSpPr>
+      <p:sp>
+        <p:nvSpPr>
+          <p:cNvPr id="4" name="TextBox 3">
+            <a:extLst>
+              <a:ext uri="{FF2B5EF4-FFF2-40B4-BE49-F238E27FC236}">
+                <a16:creationId xmlns:a16="http://schemas.microsoft.com/office/drawing/2014/main" id="{33A3B731-1912-5F5B-6021-26258ED257A8}"/>
+              </a:ext>
+            </a:extLst>
+          </p:cNvPr>
+          <p:cNvSpPr txBox="1"/>
+          <p:nvPr/>
+        </p:nvSpPr>
+        <p:spPr>
+          <a:xfrm>
+            <a:off x="534879" y="423454"/>
+            <a:ext cx="6094520" cy="369332"/>
+          </a:xfrm>
+          <a:prstGeom prst="rect">
+            <a:avLst/>
+          </a:prstGeom>
+          <a:noFill/>
+        </p:spPr>
+        <p:txBody>
+          <a:bodyPr wrap="square">
+            <a:spAutoFit/>
+          </a:bodyPr>
+          <a:lstStyle/>
+          <a:p>
+            <a:r>
+              <a:rPr lang="en-US" b="1">
+                <a:latin typeface="LiberationSans-Bold"/>
+              </a:rPr>
+              <a:t>Solution 2A</a:t>
+            </a:r>
+            <a:endParaRPr lang="en-US" dirty="0"/>
+          </a:p>
+        </p:txBody>
+      </p:sp>
+      <p:pic>
+        <p:nvPicPr>
+          <p:cNvPr id="6" name="Picture 5">
+            <a:extLst>
+              <a:ext uri="{FF2B5EF4-FFF2-40B4-BE49-F238E27FC236}">
+                <a16:creationId xmlns:a16="http://schemas.microsoft.com/office/drawing/2014/main" id="{36D7F166-6B53-CE16-F1BD-49D9FB4C6DAA}"/>
+              </a:ext>
+            </a:extLst>
+          </p:cNvPr>
+          <p:cNvPicPr>
+            <a:picLocks noChangeAspect="1"/>
+          </p:cNvPicPr>
+          <p:nvPr/>
+        </p:nvPicPr>
+        <p:blipFill>
+          <a:blip r:embed="rId2"/>
+          <a:stretch>
+            <a:fillRect/>
+          </a:stretch>
+        </p:blipFill>
+        <p:spPr>
+          <a:xfrm>
+            <a:off x="533399" y="1439117"/>
+            <a:ext cx="6465731" cy="3027889"/>
+          </a:xfrm>
+          <a:prstGeom prst="rect">
+            <a:avLst/>
+          </a:prstGeom>
+        </p:spPr>
+      </p:pic>
+      <p:sp>
+        <p:nvSpPr>
+          <p:cNvPr id="8" name="TextBox 7">
+            <a:extLst>
+              <a:ext uri="{FF2B5EF4-FFF2-40B4-BE49-F238E27FC236}">
+                <a16:creationId xmlns:a16="http://schemas.microsoft.com/office/drawing/2014/main" id="{A3FEBDC2-D1E5-298A-C477-44CF3F2EA704}"/>
+              </a:ext>
+            </a:extLst>
+          </p:cNvPr>
+          <p:cNvSpPr txBox="1"/>
+          <p:nvPr/>
+        </p:nvSpPr>
+        <p:spPr>
+          <a:xfrm>
+            <a:off x="533399" y="792786"/>
+            <a:ext cx="6096000" cy="646331"/>
+          </a:xfrm>
+          <a:prstGeom prst="rect">
+            <a:avLst/>
+          </a:prstGeom>
+          <a:noFill/>
+        </p:spPr>
+        <p:txBody>
+          <a:bodyPr wrap="square">
+            <a:spAutoFit/>
+          </a:bodyPr>
+          <a:lstStyle/>
+          <a:p>
+            <a:pPr algn="l"/>
+            <a:r>
+              <a:rPr lang="en-US" sz="1800" b="0" i="0" u="none" strike="noStrike" baseline="0" dirty="0">
+                <a:latin typeface="LiberationSerif"/>
+              </a:rPr>
+              <a:t>totally hide the requirement for a </a:t>
+            </a:r>
+            <a:r>
+              <a:rPr lang="en-US" sz="1800" b="0" i="0" u="none" strike="noStrike" baseline="0" dirty="0">
+                <a:latin typeface="UbuntuMono-Regular"/>
+              </a:rPr>
+              <a:t>Shipping Manifest </a:t>
+            </a:r>
+            <a:r>
+              <a:rPr lang="en-US" sz="1800" b="0" i="0" u="none" strike="noStrike" baseline="0" dirty="0">
+                <a:latin typeface="LiberationSerif"/>
+              </a:rPr>
+              <a:t>from</a:t>
+            </a:r>
+          </a:p>
+          <a:p>
+            <a:pPr algn="l"/>
+            <a:r>
+              <a:rPr lang="en-US" sz="1800" b="0" i="0" u="none" strike="noStrike" baseline="0" dirty="0">
+                <a:latin typeface="UbuntuMono-Regular"/>
+              </a:rPr>
+              <a:t>Order Processor</a:t>
+            </a:r>
+            <a:r>
+              <a:rPr lang="en-US" sz="1800" b="0" i="0" u="none" strike="noStrike" baseline="0" dirty="0">
+                <a:latin typeface="LiberationSerif"/>
+              </a:rPr>
+              <a:t>.</a:t>
+            </a:r>
+            <a:endParaRPr lang="en-US" dirty="0"/>
+          </a:p>
+        </p:txBody>
+      </p:sp>
+      <p:sp>
+        <p:nvSpPr>
+          <p:cNvPr id="10" name="TextBox 9">
+            <a:extLst>
+              <a:ext uri="{FF2B5EF4-FFF2-40B4-BE49-F238E27FC236}">
+                <a16:creationId xmlns:a16="http://schemas.microsoft.com/office/drawing/2014/main" id="{67BF3129-D4B6-2E4D-553E-B344B2DB4786}"/>
+              </a:ext>
+            </a:extLst>
+          </p:cNvPr>
+          <p:cNvSpPr txBox="1"/>
+          <p:nvPr/>
+        </p:nvSpPr>
+        <p:spPr>
+          <a:xfrm>
+            <a:off x="534879" y="5113337"/>
+            <a:ext cx="6094520" cy="1200329"/>
+          </a:xfrm>
+          <a:prstGeom prst="rect">
+            <a:avLst/>
+          </a:prstGeom>
+          <a:noFill/>
+        </p:spPr>
+        <p:txBody>
+          <a:bodyPr wrap="square">
+            <a:spAutoFit/>
+          </a:bodyPr>
+          <a:lstStyle/>
+          <a:p>
+            <a:pPr algn="l"/>
+            <a:r>
+              <a:rPr lang="en-US" sz="1800" b="0" i="0" u="none" strike="noStrike" baseline="0" dirty="0">
+                <a:latin typeface="LiberationSerif"/>
+              </a:rPr>
+              <a:t>While this will help protect the </a:t>
+            </a:r>
+            <a:r>
+              <a:rPr lang="en-US" sz="1800" b="0" i="0" u="none" strike="noStrike" baseline="0" dirty="0">
+                <a:latin typeface="UbuntuMono-Regular"/>
+              </a:rPr>
+              <a:t>Warehouse </a:t>
+            </a:r>
+            <a:r>
+              <a:rPr lang="en-US" sz="1800" b="0" i="0" u="none" strike="noStrike" baseline="0" dirty="0">
+                <a:latin typeface="LiberationSerif"/>
+              </a:rPr>
+              <a:t>microservice from some changes to</a:t>
+            </a:r>
+          </a:p>
+          <a:p>
+            <a:pPr algn="l"/>
+            <a:r>
+              <a:rPr lang="en-US" sz="1800" b="0" i="0" u="none" strike="noStrike" baseline="0" dirty="0">
+                <a:latin typeface="UbuntuMono-Regular"/>
+              </a:rPr>
+              <a:t>Shipping</a:t>
+            </a:r>
+            <a:r>
+              <a:rPr lang="en-US" sz="1800" b="0" i="0" u="none" strike="noStrike" baseline="0" dirty="0">
+                <a:latin typeface="LiberationSerif"/>
+              </a:rPr>
+              <a:t>, there are some things that would still require all parties to change.</a:t>
+            </a:r>
+            <a:endParaRPr lang="en-US" dirty="0"/>
+          </a:p>
+        </p:txBody>
+      </p:sp>
+      <p:sp>
+        <p:nvSpPr>
+          <p:cNvPr id="12" name="TextBox 11">
+            <a:extLst>
+              <a:ext uri="{FF2B5EF4-FFF2-40B4-BE49-F238E27FC236}">
+                <a16:creationId xmlns:a16="http://schemas.microsoft.com/office/drawing/2014/main" id="{093F65B0-3185-54AD-164C-60A33CF25408}"/>
+              </a:ext>
+            </a:extLst>
+          </p:cNvPr>
+          <p:cNvSpPr txBox="1"/>
+          <p:nvPr/>
+        </p:nvSpPr>
+        <p:spPr>
+          <a:xfrm>
+            <a:off x="6097480" y="544334"/>
+            <a:ext cx="6094520" cy="2031325"/>
+          </a:xfrm>
+          <a:prstGeom prst="rect">
+            <a:avLst/>
+          </a:prstGeom>
+          <a:noFill/>
+        </p:spPr>
+        <p:txBody>
+          <a:bodyPr wrap="square">
+            <a:spAutoFit/>
+          </a:bodyPr>
+          <a:lstStyle/>
+          <a:p>
+            <a:pPr algn="l"/>
+            <a:r>
+              <a:rPr lang="en-US" sz="1800" b="0" i="0" u="none" strike="noStrike" baseline="0" dirty="0">
+                <a:latin typeface="LiberationSerif"/>
+              </a:rPr>
+              <a:t>final approach that could help reduce the pass-through coupling would be</a:t>
+            </a:r>
+          </a:p>
+          <a:p>
+            <a:pPr algn="l"/>
+            <a:r>
+              <a:rPr lang="en-US" sz="1800" b="0" i="0" u="none" strike="noStrike" baseline="0" dirty="0">
+                <a:latin typeface="LiberationSerif"/>
+              </a:rPr>
+              <a:t>for the </a:t>
+            </a:r>
+            <a:r>
+              <a:rPr lang="en-US" sz="1800" b="0" i="0" u="none" strike="noStrike" baseline="0" dirty="0">
+                <a:latin typeface="UbuntuMono-Regular"/>
+              </a:rPr>
+              <a:t>Order Processor </a:t>
+            </a:r>
+            <a:r>
+              <a:rPr lang="en-US" sz="1800" b="0" i="0" u="none" strike="noStrike" baseline="0" dirty="0">
+                <a:latin typeface="LiberationSerif"/>
+              </a:rPr>
+              <a:t>to still send the </a:t>
+            </a:r>
+            <a:r>
+              <a:rPr lang="en-US" sz="1800" b="0" i="0" u="none" strike="noStrike" baseline="0" dirty="0">
+                <a:latin typeface="UbuntuMono-Regular"/>
+              </a:rPr>
+              <a:t>Shipping Manifest </a:t>
+            </a:r>
+            <a:r>
+              <a:rPr lang="en-US" sz="1800" b="0" i="0" u="none" strike="noStrike" baseline="0" dirty="0">
+                <a:latin typeface="LiberationSerif"/>
+              </a:rPr>
+              <a:t>to the </a:t>
+            </a:r>
+            <a:r>
+              <a:rPr lang="en-US" sz="1800" b="0" i="0" u="none" strike="noStrike" baseline="0" dirty="0">
+                <a:latin typeface="UbuntuMono-Regular"/>
+              </a:rPr>
+              <a:t>Shipping</a:t>
+            </a:r>
+          </a:p>
+          <a:p>
+            <a:pPr algn="l"/>
+            <a:r>
+              <a:rPr lang="en-US" sz="1800" b="0" i="0" u="none" strike="noStrike" baseline="0" dirty="0">
+                <a:latin typeface="LiberationSerif"/>
+              </a:rPr>
+              <a:t>microservice via the </a:t>
+            </a:r>
+            <a:r>
+              <a:rPr lang="en-US" sz="1800" b="0" i="0" u="none" strike="noStrike" baseline="0" dirty="0">
+                <a:latin typeface="UbuntuMono-Regular"/>
+              </a:rPr>
+              <a:t>Warehouse</a:t>
+            </a:r>
+            <a:r>
+              <a:rPr lang="en-US" sz="1800" b="0" i="0" u="none" strike="noStrike" baseline="0" dirty="0">
+                <a:latin typeface="LiberationSerif"/>
+              </a:rPr>
+              <a:t>, but to have the </a:t>
+            </a:r>
+            <a:r>
+              <a:rPr lang="en-US" sz="1800" b="0" i="0" u="none" strike="noStrike" baseline="0" dirty="0">
+                <a:latin typeface="UbuntuMono-Regular"/>
+              </a:rPr>
+              <a:t>Warehouse </a:t>
+            </a:r>
+            <a:r>
+              <a:rPr lang="en-US" sz="1800" b="0" i="0" u="none" strike="noStrike" baseline="0" dirty="0">
+                <a:latin typeface="LiberationSerif"/>
+              </a:rPr>
+              <a:t>be totally unaware</a:t>
+            </a:r>
+          </a:p>
+          <a:p>
+            <a:pPr algn="l"/>
+            <a:r>
+              <a:rPr lang="en-US" sz="1800" b="0" i="0" u="none" strike="noStrike" baseline="0" dirty="0">
+                <a:latin typeface="LiberationSerif"/>
+              </a:rPr>
+              <a:t>of the structure of the </a:t>
+            </a:r>
+            <a:r>
+              <a:rPr lang="en-US" sz="1800" b="0" i="0" u="none" strike="noStrike" baseline="0" dirty="0">
+                <a:latin typeface="UbuntuMono-Regular"/>
+              </a:rPr>
+              <a:t>Shipping Manifest </a:t>
+            </a:r>
+            <a:r>
+              <a:rPr lang="en-US" sz="1800" b="0" i="0" u="none" strike="noStrike" baseline="0" dirty="0">
+                <a:latin typeface="LiberationSerif"/>
+              </a:rPr>
+              <a:t>itself.</a:t>
+            </a:r>
+            <a:endParaRPr lang="en-US" dirty="0"/>
+          </a:p>
+        </p:txBody>
+      </p:sp>
+      <p:sp>
+        <p:nvSpPr>
+          <p:cNvPr id="13" name="TextBox 12">
+            <a:extLst>
+              <a:ext uri="{FF2B5EF4-FFF2-40B4-BE49-F238E27FC236}">
+                <a16:creationId xmlns:a16="http://schemas.microsoft.com/office/drawing/2014/main" id="{6911BBE4-361A-4823-C053-AD7E957B5E3F}"/>
+              </a:ext>
+            </a:extLst>
+          </p:cNvPr>
+          <p:cNvSpPr txBox="1"/>
+          <p:nvPr/>
+        </p:nvSpPr>
+        <p:spPr>
+          <a:xfrm>
+            <a:off x="6094521" y="178348"/>
+            <a:ext cx="6094520" cy="369332"/>
+          </a:xfrm>
+          <a:prstGeom prst="rect">
+            <a:avLst/>
+          </a:prstGeom>
+          <a:noFill/>
+        </p:spPr>
+        <p:txBody>
+          <a:bodyPr wrap="square">
+            <a:spAutoFit/>
+          </a:bodyPr>
+          <a:lstStyle/>
+          <a:p>
+            <a:r>
+              <a:rPr lang="en-US" b="1" dirty="0">
+                <a:latin typeface="LiberationSans-Bold"/>
+              </a:rPr>
+              <a:t>Solution 2B</a:t>
+            </a:r>
+            <a:endParaRPr lang="en-US" dirty="0"/>
+          </a:p>
+        </p:txBody>
+      </p:sp>
+    </p:spTree>
+    <p:extLst>
+      <p:ext uri="{BB962C8B-B14F-4D97-AF65-F5344CB8AC3E}">
+        <p14:creationId xmlns:p14="http://schemas.microsoft.com/office/powerpoint/2010/main" val="411012267"/>
+      </p:ext>
+    </p:extLst>
+  </p:cSld>
+  <p:clrMapOvr>
+    <a:masterClrMapping/>
+  </p:clrMapOvr>
+</p:sld>
+</file>
+
+<file path=ppt/slides/slide14.xml><?xml version="1.0" encoding="utf-8"?>
+<p:sld xmlns:a="http://schemas.openxmlformats.org/drawingml/2006/main" xmlns:r="http://schemas.openxmlformats.org/officeDocument/2006/relationships" xmlns:p="http://schemas.openxmlformats.org/presentationml/2006/main">
+  <p:cSld>
+    <p:spTree>
+      <p:nvGrpSpPr>
+        <p:cNvPr id="1" name=""/>
+        <p:cNvGrpSpPr/>
+        <p:nvPr/>
+      </p:nvGrpSpPr>
+      <p:grpSpPr>
+        <a:xfrm>
+          <a:off x="0" y="0"/>
+          <a:ext cx="0" cy="0"/>
+          <a:chOff x="0" y="0"/>
+          <a:chExt cx="0" cy="0"/>
+        </a:xfrm>
+      </p:grpSpPr>
+      <p:sp>
+        <p:nvSpPr>
+          <p:cNvPr id="5" name="TextBox 4">
+            <a:extLst>
+              <a:ext uri="{FF2B5EF4-FFF2-40B4-BE49-F238E27FC236}">
+                <a16:creationId xmlns:a16="http://schemas.microsoft.com/office/drawing/2014/main" id="{40A40812-DB0C-3DCB-9466-FD8B050759A4}"/>
+              </a:ext>
+            </a:extLst>
+          </p:cNvPr>
+          <p:cNvSpPr txBox="1"/>
+          <p:nvPr/>
+        </p:nvSpPr>
+        <p:spPr>
+          <a:xfrm>
+            <a:off x="437225" y="387943"/>
+            <a:ext cx="6094520" cy="369332"/>
+          </a:xfrm>
+          <a:prstGeom prst="rect">
+            <a:avLst/>
+          </a:prstGeom>
+          <a:noFill/>
+        </p:spPr>
+        <p:txBody>
+          <a:bodyPr wrap="square">
+            <a:spAutoFit/>
+          </a:bodyPr>
+          <a:lstStyle/>
+          <a:p>
+            <a:r>
+              <a:rPr lang="en-US" sz="1800" b="1" i="0" u="none" strike="noStrike" baseline="0" dirty="0">
+                <a:latin typeface="LiberationSans-Bold"/>
+              </a:rPr>
+              <a:t>Common Coupling</a:t>
+            </a:r>
+            <a:endParaRPr lang="en-US" dirty="0"/>
+          </a:p>
+        </p:txBody>
+      </p:sp>
+      <p:sp>
+        <p:nvSpPr>
+          <p:cNvPr id="7" name="TextBox 6">
+            <a:extLst>
+              <a:ext uri="{FF2B5EF4-FFF2-40B4-BE49-F238E27FC236}">
+                <a16:creationId xmlns:a16="http://schemas.microsoft.com/office/drawing/2014/main" id="{EB1BEBFA-833B-D24A-20C9-8CC348C09CB6}"/>
+              </a:ext>
+            </a:extLst>
+          </p:cNvPr>
+          <p:cNvSpPr txBox="1"/>
+          <p:nvPr/>
+        </p:nvSpPr>
+        <p:spPr>
+          <a:xfrm>
+            <a:off x="437225" y="757275"/>
+            <a:ext cx="6094520" cy="646331"/>
+          </a:xfrm>
+          <a:prstGeom prst="rect">
+            <a:avLst/>
+          </a:prstGeom>
+          <a:noFill/>
+        </p:spPr>
+        <p:txBody>
+          <a:bodyPr wrap="square">
+            <a:spAutoFit/>
+          </a:bodyPr>
+          <a:lstStyle/>
+          <a:p>
+            <a:pPr algn="l"/>
+            <a:r>
+              <a:rPr lang="en-US" sz="1800" b="0" i="1" u="none" strike="noStrike" baseline="0" dirty="0">
+                <a:latin typeface="LiberationSerif"/>
+              </a:rPr>
+              <a:t>when two or more microservices make use of a common set of data </a:t>
+            </a:r>
+            <a:r>
+              <a:rPr lang="en-US" sz="1800" b="0" i="0" u="none" strike="noStrike" baseline="0" dirty="0">
+                <a:latin typeface="LiberationSerif"/>
+              </a:rPr>
+              <a:t>i.e., database, shared memory, or shared file system</a:t>
+            </a:r>
+            <a:endParaRPr lang="en-US" dirty="0"/>
+          </a:p>
+        </p:txBody>
+      </p:sp>
+      <p:sp>
+        <p:nvSpPr>
+          <p:cNvPr id="9" name="TextBox 8">
+            <a:extLst>
+              <a:ext uri="{FF2B5EF4-FFF2-40B4-BE49-F238E27FC236}">
+                <a16:creationId xmlns:a16="http://schemas.microsoft.com/office/drawing/2014/main" id="{B65D03D0-E69B-26EC-70B6-BE28E482C845}"/>
+              </a:ext>
+            </a:extLst>
+          </p:cNvPr>
+          <p:cNvSpPr txBox="1"/>
+          <p:nvPr/>
+        </p:nvSpPr>
+        <p:spPr>
+          <a:xfrm>
+            <a:off x="437225" y="1772938"/>
+            <a:ext cx="6094520" cy="646331"/>
+          </a:xfrm>
+          <a:prstGeom prst="rect">
+            <a:avLst/>
+          </a:prstGeom>
+          <a:noFill/>
+        </p:spPr>
+        <p:txBody>
+          <a:bodyPr wrap="square">
+            <a:spAutoFit/>
+          </a:bodyPr>
+          <a:lstStyle/>
+          <a:p>
+            <a:pPr algn="l"/>
+            <a:r>
+              <a:rPr lang="en-US" sz="1800" b="0" i="0" u="none" strike="noStrike" baseline="0" dirty="0">
+                <a:latin typeface="LiberationSerif"/>
+              </a:rPr>
+              <a:t>changes to the structure of the data</a:t>
+            </a:r>
+          </a:p>
+          <a:p>
+            <a:pPr algn="l"/>
+            <a:r>
+              <a:rPr lang="en-US" sz="1800" b="0" i="0" u="none" strike="noStrike" baseline="0" dirty="0">
+                <a:latin typeface="LiberationSerif"/>
+              </a:rPr>
+              <a:t>can impact multiple microservices at once.</a:t>
+            </a:r>
+            <a:endParaRPr lang="en-US" dirty="0"/>
+          </a:p>
+        </p:txBody>
+      </p:sp>
+      <p:pic>
+        <p:nvPicPr>
+          <p:cNvPr id="11" name="Picture 10">
+            <a:extLst>
+              <a:ext uri="{FF2B5EF4-FFF2-40B4-BE49-F238E27FC236}">
+                <a16:creationId xmlns:a16="http://schemas.microsoft.com/office/drawing/2014/main" id="{5D039970-B832-B3F8-8504-B8E06085E984}"/>
+              </a:ext>
+            </a:extLst>
+          </p:cNvPr>
+          <p:cNvPicPr>
+            <a:picLocks noChangeAspect="1"/>
+          </p:cNvPicPr>
+          <p:nvPr/>
+        </p:nvPicPr>
+        <p:blipFill>
+          <a:blip r:embed="rId2"/>
+          <a:stretch>
+            <a:fillRect/>
+          </a:stretch>
+        </p:blipFill>
+        <p:spPr>
+          <a:xfrm>
+            <a:off x="6531745" y="757275"/>
+            <a:ext cx="3165259" cy="2352843"/>
+          </a:xfrm>
+          <a:prstGeom prst="rect">
+            <a:avLst/>
+          </a:prstGeom>
+        </p:spPr>
+      </p:pic>
+      <p:sp>
+        <p:nvSpPr>
+          <p:cNvPr id="13" name="TextBox 12">
+            <a:extLst>
+              <a:ext uri="{FF2B5EF4-FFF2-40B4-BE49-F238E27FC236}">
+                <a16:creationId xmlns:a16="http://schemas.microsoft.com/office/drawing/2014/main" id="{43F22AF9-D008-609F-8EC9-6CDD931A1070}"/>
+              </a:ext>
+            </a:extLst>
+          </p:cNvPr>
+          <p:cNvSpPr txBox="1"/>
+          <p:nvPr/>
+        </p:nvSpPr>
+        <p:spPr>
+          <a:xfrm>
+            <a:off x="437225" y="2782669"/>
+            <a:ext cx="6094520" cy="646331"/>
+          </a:xfrm>
+          <a:prstGeom prst="rect">
+            <a:avLst/>
+          </a:prstGeom>
+          <a:noFill/>
+        </p:spPr>
+        <p:txBody>
+          <a:bodyPr wrap="square">
+            <a:spAutoFit/>
+          </a:bodyPr>
+          <a:lstStyle/>
+          <a:p>
+            <a:pPr algn="l"/>
+            <a:r>
+              <a:rPr lang="en-US" b="1" dirty="0">
+                <a:latin typeface="LiberationSerif"/>
+              </a:rPr>
+              <a:t>Ok</a:t>
+            </a:r>
+            <a:r>
+              <a:rPr lang="en-US" dirty="0">
+                <a:latin typeface="LiberationSerif"/>
+              </a:rPr>
+              <a:t> - </a:t>
+            </a:r>
+            <a:r>
+              <a:rPr lang="en-US" sz="1800" b="0" i="0" u="none" strike="noStrike" baseline="0" dirty="0">
+                <a:latin typeface="LiberationSerif"/>
+              </a:rPr>
+              <a:t>static reference data doesn’t tend to change often, and</a:t>
+            </a:r>
+          </a:p>
+          <a:p>
+            <a:pPr algn="l"/>
+            <a:r>
+              <a:rPr lang="en-US" sz="1800" b="0" i="0" u="none" strike="noStrike" baseline="0" dirty="0">
+                <a:latin typeface="LiberationSerif"/>
+              </a:rPr>
+              <a:t>because this data is read-only—</a:t>
+            </a:r>
+            <a:endParaRPr lang="en-US" dirty="0"/>
+          </a:p>
+        </p:txBody>
+      </p:sp>
+      <p:sp>
+        <p:nvSpPr>
+          <p:cNvPr id="15" name="TextBox 14">
+            <a:extLst>
+              <a:ext uri="{FF2B5EF4-FFF2-40B4-BE49-F238E27FC236}">
+                <a16:creationId xmlns:a16="http://schemas.microsoft.com/office/drawing/2014/main" id="{989D979E-3BB7-D307-81FA-F261C7C8F841}"/>
+              </a:ext>
+            </a:extLst>
+          </p:cNvPr>
+          <p:cNvSpPr txBox="1"/>
+          <p:nvPr/>
+        </p:nvSpPr>
+        <p:spPr>
+          <a:xfrm>
+            <a:off x="437225" y="3792400"/>
+            <a:ext cx="6094520" cy="923330"/>
+          </a:xfrm>
+          <a:prstGeom prst="rect">
+            <a:avLst/>
+          </a:prstGeom>
+          <a:noFill/>
+        </p:spPr>
+        <p:txBody>
+          <a:bodyPr wrap="square">
+            <a:spAutoFit/>
+          </a:bodyPr>
+          <a:lstStyle/>
+          <a:p>
+            <a:pPr algn="l"/>
+            <a:r>
+              <a:rPr lang="en-US" sz="1800" b="1" i="0" u="none" strike="noStrike" baseline="0" dirty="0">
+                <a:latin typeface="LiberationSerif"/>
+              </a:rPr>
+              <a:t>Problematic</a:t>
+            </a:r>
+            <a:r>
+              <a:rPr lang="en-US" sz="1800" b="0" i="0" u="none" strike="noStrike" baseline="0" dirty="0">
+                <a:latin typeface="LiberationSerif"/>
+              </a:rPr>
+              <a:t> - structure of the common data changes more frequently, or if multiple microservices are reading and writing to the same data.</a:t>
+            </a:r>
+            <a:endParaRPr lang="en-US" dirty="0"/>
+          </a:p>
+        </p:txBody>
+      </p:sp>
+      <p:pic>
+        <p:nvPicPr>
+          <p:cNvPr id="17" name="Picture 16">
+            <a:extLst>
+              <a:ext uri="{FF2B5EF4-FFF2-40B4-BE49-F238E27FC236}">
+                <a16:creationId xmlns:a16="http://schemas.microsoft.com/office/drawing/2014/main" id="{282DB91C-42A4-23F6-BCA4-A813C58ADFE3}"/>
+              </a:ext>
+            </a:extLst>
+          </p:cNvPr>
+          <p:cNvPicPr>
+            <a:picLocks noChangeAspect="1"/>
+          </p:cNvPicPr>
+          <p:nvPr/>
+        </p:nvPicPr>
+        <p:blipFill>
+          <a:blip r:embed="rId3"/>
+          <a:stretch>
+            <a:fillRect/>
+          </a:stretch>
+        </p:blipFill>
+        <p:spPr>
+          <a:xfrm>
+            <a:off x="6531745" y="3792400"/>
+            <a:ext cx="4902694" cy="2814354"/>
+          </a:xfrm>
+          <a:prstGeom prst="rect">
+            <a:avLst/>
+          </a:prstGeom>
+        </p:spPr>
+      </p:pic>
+      <p:sp>
+        <p:nvSpPr>
+          <p:cNvPr id="19" name="TextBox 18">
+            <a:extLst>
+              <a:ext uri="{FF2B5EF4-FFF2-40B4-BE49-F238E27FC236}">
+                <a16:creationId xmlns:a16="http://schemas.microsoft.com/office/drawing/2014/main" id="{AA6E2CC1-252D-8DAB-A9AC-AABC8D256E2D}"/>
+              </a:ext>
+            </a:extLst>
+          </p:cNvPr>
+          <p:cNvSpPr txBox="1"/>
+          <p:nvPr/>
+        </p:nvSpPr>
+        <p:spPr>
+          <a:xfrm>
+            <a:off x="437225" y="4903362"/>
+            <a:ext cx="6094520" cy="923330"/>
+          </a:xfrm>
+          <a:prstGeom prst="rect">
+            <a:avLst/>
+          </a:prstGeom>
+          <a:noFill/>
+        </p:spPr>
+        <p:txBody>
+          <a:bodyPr wrap="square">
+            <a:spAutoFit/>
+          </a:bodyPr>
+          <a:lstStyle/>
+          <a:p>
+            <a:pPr algn="l"/>
+            <a:r>
+              <a:rPr lang="en-US" sz="1800" b="0" i="0" u="none" strike="noStrike" baseline="0" dirty="0">
+                <a:latin typeface="LiberationSerif"/>
+              </a:rPr>
+              <a:t>Conceptually, we have both the </a:t>
+            </a:r>
+            <a:r>
+              <a:rPr lang="en-US" sz="1800" b="0" i="0" u="none" strike="noStrike" baseline="0" dirty="0">
+                <a:latin typeface="UbuntuMono-Regular"/>
+              </a:rPr>
+              <a:t>Order Processor </a:t>
+            </a:r>
+            <a:r>
+              <a:rPr lang="en-US" sz="1800" b="0" i="0" u="none" strike="noStrike" baseline="0" dirty="0">
+                <a:latin typeface="LiberationSerif"/>
+              </a:rPr>
+              <a:t>and </a:t>
+            </a:r>
+            <a:r>
+              <a:rPr lang="en-US" sz="1800" b="0" i="0" u="none" strike="noStrike" baseline="0" dirty="0">
+                <a:latin typeface="UbuntuMono-Regular"/>
+              </a:rPr>
+              <a:t>Warehouse </a:t>
+            </a:r>
+            <a:r>
+              <a:rPr lang="en-US" sz="1800" b="0" i="0" u="none" strike="noStrike" baseline="0" dirty="0">
+                <a:latin typeface="LiberationSerif"/>
+              </a:rPr>
+              <a:t>microservices managing different aspects of the life cycle of an order.</a:t>
+            </a:r>
+            <a:endParaRPr lang="en-US" dirty="0"/>
+          </a:p>
+        </p:txBody>
+      </p:sp>
+      <p:sp>
+        <p:nvSpPr>
+          <p:cNvPr id="21" name="TextBox 20">
+            <a:extLst>
+              <a:ext uri="{FF2B5EF4-FFF2-40B4-BE49-F238E27FC236}">
+                <a16:creationId xmlns:a16="http://schemas.microsoft.com/office/drawing/2014/main" id="{7340506A-1BA0-3283-F252-75921CF8CCA1}"/>
+              </a:ext>
+            </a:extLst>
+          </p:cNvPr>
+          <p:cNvSpPr txBox="1"/>
+          <p:nvPr/>
+        </p:nvSpPr>
+        <p:spPr>
+          <a:xfrm>
+            <a:off x="437225" y="6008392"/>
+            <a:ext cx="6094520" cy="923330"/>
+          </a:xfrm>
+          <a:prstGeom prst="rect">
+            <a:avLst/>
+          </a:prstGeom>
+          <a:noFill/>
+        </p:spPr>
+        <p:txBody>
+          <a:bodyPr wrap="square">
+            <a:spAutoFit/>
+          </a:bodyPr>
+          <a:lstStyle/>
+          <a:p>
+            <a:pPr algn="l"/>
+            <a:r>
+              <a:rPr lang="en-US" sz="1800" b="0" i="0" u="none" strike="noStrike" baseline="0" dirty="0">
+                <a:latin typeface="LiberationSerif"/>
+              </a:rPr>
+              <a:t>can I be sure that I am not changing the</a:t>
+            </a:r>
+          </a:p>
+          <a:p>
+            <a:pPr algn="l"/>
+            <a:r>
+              <a:rPr lang="en-US" sz="1800" b="0" i="0" u="none" strike="noStrike" baseline="0" dirty="0">
+                <a:latin typeface="LiberationSerif"/>
+              </a:rPr>
+              <a:t>order data in such a way that it breaks </a:t>
+            </a:r>
+            <a:r>
+              <a:rPr lang="en-US" sz="1800" b="0" i="0" u="none" strike="noStrike" baseline="0" dirty="0">
+                <a:latin typeface="UbuntuMono-Regular"/>
+              </a:rPr>
+              <a:t>Warehouse</a:t>
+            </a:r>
+            <a:r>
+              <a:rPr lang="en-US" sz="1800" b="0" i="0" u="none" strike="noStrike" baseline="0" dirty="0">
+                <a:latin typeface="LiberationSerif"/>
+              </a:rPr>
+              <a:t>’s view of the world, or vice versa?</a:t>
+            </a:r>
+            <a:endParaRPr lang="en-US" dirty="0"/>
+          </a:p>
+        </p:txBody>
+      </p:sp>
+    </p:spTree>
+    <p:extLst>
+      <p:ext uri="{BB962C8B-B14F-4D97-AF65-F5344CB8AC3E}">
+        <p14:creationId xmlns:p14="http://schemas.microsoft.com/office/powerpoint/2010/main" val="2163404781"/>
+      </p:ext>
+    </p:extLst>
+  </p:cSld>
+  <p:clrMapOvr>
+    <a:masterClrMapping/>
+  </p:clrMapOvr>
+</p:sld>
+</file>
+
+<file path=ppt/slides/slide15.xml><?xml version="1.0" encoding="utf-8"?>
+<p:sld xmlns:a="http://schemas.openxmlformats.org/drawingml/2006/main" xmlns:r="http://schemas.openxmlformats.org/officeDocument/2006/relationships" xmlns:p="http://schemas.openxmlformats.org/presentationml/2006/main">
+  <p:cSld>
+    <p:spTree>
+      <p:nvGrpSpPr>
+        <p:cNvPr id="1" name=""/>
+        <p:cNvGrpSpPr/>
+        <p:nvPr/>
+      </p:nvGrpSpPr>
+      <p:grpSpPr>
+        <a:xfrm>
+          <a:off x="0" y="0"/>
+          <a:ext cx="0" cy="0"/>
+          <a:chOff x="0" y="0"/>
+          <a:chExt cx="0" cy="0"/>
+        </a:xfrm>
+      </p:grpSpPr>
+      <p:sp>
+        <p:nvSpPr>
+          <p:cNvPr id="4" name="TextBox 3">
+            <a:extLst>
+              <a:ext uri="{FF2B5EF4-FFF2-40B4-BE49-F238E27FC236}">
+                <a16:creationId xmlns:a16="http://schemas.microsoft.com/office/drawing/2014/main" id="{96802CBD-7A17-F3E6-5D4D-F24E05A7F42E}"/>
+              </a:ext>
+            </a:extLst>
+          </p:cNvPr>
+          <p:cNvSpPr txBox="1"/>
+          <p:nvPr/>
+        </p:nvSpPr>
+        <p:spPr>
+          <a:xfrm>
+            <a:off x="437225" y="387943"/>
+            <a:ext cx="6094520" cy="369332"/>
+          </a:xfrm>
+          <a:prstGeom prst="rect">
+            <a:avLst/>
+          </a:prstGeom>
+          <a:noFill/>
+        </p:spPr>
+        <p:txBody>
+          <a:bodyPr wrap="square">
+            <a:spAutoFit/>
+          </a:bodyPr>
+          <a:lstStyle/>
+          <a:p>
+            <a:r>
+              <a:rPr lang="en-US" sz="1800" b="1" i="0" u="none" strike="noStrike" baseline="0" dirty="0">
+                <a:latin typeface="LiberationSans-Bold"/>
+              </a:rPr>
+              <a:t>Solution 1 – Finite State Machine</a:t>
+            </a:r>
+            <a:endParaRPr lang="en-US" dirty="0"/>
+          </a:p>
+        </p:txBody>
+      </p:sp>
+      <p:pic>
+        <p:nvPicPr>
+          <p:cNvPr id="6" name="Picture 5">
+            <a:extLst>
+              <a:ext uri="{FF2B5EF4-FFF2-40B4-BE49-F238E27FC236}">
+                <a16:creationId xmlns:a16="http://schemas.microsoft.com/office/drawing/2014/main" id="{49DD4D87-16A0-E14F-7F5D-68D0EFE6C4A3}"/>
+              </a:ext>
+            </a:extLst>
+          </p:cNvPr>
+          <p:cNvPicPr>
+            <a:picLocks noChangeAspect="1"/>
+          </p:cNvPicPr>
+          <p:nvPr/>
+        </p:nvPicPr>
+        <p:blipFill>
+          <a:blip r:embed="rId2"/>
+          <a:stretch>
+            <a:fillRect/>
+          </a:stretch>
+        </p:blipFill>
+        <p:spPr>
+          <a:xfrm>
+            <a:off x="437225" y="757275"/>
+            <a:ext cx="5931506" cy="1652689"/>
+          </a:xfrm>
+          <a:prstGeom prst="rect">
+            <a:avLst/>
+          </a:prstGeom>
+        </p:spPr>
+      </p:pic>
+      <p:sp>
+        <p:nvSpPr>
+          <p:cNvPr id="8" name="TextBox 7">
+            <a:extLst>
+              <a:ext uri="{FF2B5EF4-FFF2-40B4-BE49-F238E27FC236}">
+                <a16:creationId xmlns:a16="http://schemas.microsoft.com/office/drawing/2014/main" id="{32AEF55F-7878-7EC6-2872-E469FC54CD0F}"/>
+              </a:ext>
+            </a:extLst>
+          </p:cNvPr>
+          <p:cNvSpPr txBox="1"/>
+          <p:nvPr/>
+        </p:nvSpPr>
+        <p:spPr>
+          <a:xfrm>
+            <a:off x="437225" y="2779296"/>
+            <a:ext cx="6096000" cy="369332"/>
+          </a:xfrm>
+          <a:prstGeom prst="rect">
+            <a:avLst/>
+          </a:prstGeom>
+          <a:noFill/>
+        </p:spPr>
+        <p:txBody>
+          <a:bodyPr wrap="square">
+            <a:spAutoFit/>
+          </a:bodyPr>
+          <a:lstStyle/>
+          <a:p>
+            <a:pPr algn="l"/>
+            <a:r>
+              <a:rPr lang="en-US" sz="1800" b="0" i="1" u="none" strike="noStrike" baseline="0" dirty="0">
+                <a:latin typeface="LiberationSerif"/>
+              </a:rPr>
+              <a:t>a single microservice manages the order state</a:t>
+            </a:r>
+            <a:endParaRPr lang="en-US" i="1" dirty="0"/>
+          </a:p>
+        </p:txBody>
+      </p:sp>
+      <p:sp>
+        <p:nvSpPr>
+          <p:cNvPr id="10" name="TextBox 9">
+            <a:extLst>
+              <a:ext uri="{FF2B5EF4-FFF2-40B4-BE49-F238E27FC236}">
+                <a16:creationId xmlns:a16="http://schemas.microsoft.com/office/drawing/2014/main" id="{CC26A6EE-FE87-1DB1-76A0-E7DF1516D730}"/>
+              </a:ext>
+            </a:extLst>
+          </p:cNvPr>
+          <p:cNvSpPr txBox="1"/>
+          <p:nvPr/>
+        </p:nvSpPr>
+        <p:spPr>
+          <a:xfrm>
+            <a:off x="437225" y="3517960"/>
+            <a:ext cx="6094520" cy="1292662"/>
+          </a:xfrm>
+          <a:prstGeom prst="rect">
+            <a:avLst/>
+          </a:prstGeom>
+          <a:noFill/>
+        </p:spPr>
+        <p:txBody>
+          <a:bodyPr wrap="square">
+            <a:spAutoFit/>
+          </a:bodyPr>
+          <a:lstStyle/>
+          <a:p>
+            <a:pPr algn="l"/>
+            <a:r>
+              <a:rPr lang="en-US" sz="2400" b="1" i="0" u="none" strike="noStrike" baseline="0" dirty="0">
+                <a:solidFill>
+                  <a:srgbClr val="737373"/>
+                </a:solidFill>
+                <a:latin typeface="LiberationSans-Bold"/>
+              </a:rPr>
+              <a:t>TIP</a:t>
+            </a:r>
+          </a:p>
+          <a:p>
+            <a:pPr algn="l"/>
+            <a:r>
+              <a:rPr lang="en-US" sz="1800" b="0" i="0" u="none" strike="noStrike" baseline="0" dirty="0">
+                <a:solidFill>
+                  <a:srgbClr val="000000"/>
+                </a:solidFill>
+                <a:latin typeface="LiberationSerif"/>
+              </a:rPr>
+              <a:t>Make sure you see a request that is sent to a microservice as something that the downstream microservice can reject if it is invalid.</a:t>
+            </a:r>
+            <a:endParaRPr lang="en-US" dirty="0"/>
+          </a:p>
+        </p:txBody>
+      </p:sp>
+      <p:sp>
+        <p:nvSpPr>
+          <p:cNvPr id="12" name="TextBox 11">
+            <a:extLst>
+              <a:ext uri="{FF2B5EF4-FFF2-40B4-BE49-F238E27FC236}">
+                <a16:creationId xmlns:a16="http://schemas.microsoft.com/office/drawing/2014/main" id="{1119B705-D752-22BD-B1A5-25548AEF0DCE}"/>
+              </a:ext>
+            </a:extLst>
+          </p:cNvPr>
+          <p:cNvSpPr txBox="1"/>
+          <p:nvPr/>
+        </p:nvSpPr>
+        <p:spPr>
+          <a:xfrm>
+            <a:off x="6097480" y="1585715"/>
+            <a:ext cx="6094520" cy="2123658"/>
+          </a:xfrm>
+          <a:prstGeom prst="rect">
+            <a:avLst/>
+          </a:prstGeom>
+          <a:noFill/>
+        </p:spPr>
+        <p:txBody>
+          <a:bodyPr wrap="square">
+            <a:spAutoFit/>
+          </a:bodyPr>
+          <a:lstStyle/>
+          <a:p>
+            <a:pPr algn="l"/>
+            <a:r>
+              <a:rPr lang="en-US" sz="2400" b="1" i="0" u="none" strike="noStrike" baseline="0" dirty="0">
+                <a:solidFill>
+                  <a:srgbClr val="C77171"/>
+                </a:solidFill>
+                <a:latin typeface="LiberationSans-Bold"/>
+              </a:rPr>
+              <a:t>WARNING</a:t>
+            </a:r>
+          </a:p>
+          <a:p>
+            <a:pPr algn="l"/>
+            <a:r>
+              <a:rPr lang="en-US" sz="1800" b="0" i="0" u="none" strike="noStrike" baseline="0" dirty="0">
+                <a:solidFill>
+                  <a:srgbClr val="000000"/>
+                </a:solidFill>
+                <a:latin typeface="LiberationSerif"/>
+              </a:rPr>
+              <a:t>If you see a microservice that just looks like a thin wrapper around database CRUD operations,</a:t>
+            </a:r>
+          </a:p>
+          <a:p>
+            <a:pPr algn="l"/>
+            <a:r>
+              <a:rPr lang="en-US" sz="1800" b="0" i="0" u="none" strike="noStrike" baseline="0" dirty="0">
+                <a:solidFill>
+                  <a:srgbClr val="000000"/>
+                </a:solidFill>
+                <a:latin typeface="LiberationSerif"/>
+              </a:rPr>
+              <a:t>that is a sign that you may have weak cohesion and tighter coupling, as logic that should be in</a:t>
+            </a:r>
+          </a:p>
+          <a:p>
+            <a:pPr algn="l"/>
+            <a:r>
+              <a:rPr lang="en-US" sz="1800" b="0" i="0" u="none" strike="noStrike" baseline="0" dirty="0">
+                <a:solidFill>
+                  <a:srgbClr val="000000"/>
+                </a:solidFill>
+                <a:latin typeface="LiberationSerif"/>
+              </a:rPr>
+              <a:t>that service to manage the data is instead spread elsewhere in your system.</a:t>
+            </a:r>
+            <a:endParaRPr lang="en-US" dirty="0"/>
+          </a:p>
+        </p:txBody>
+      </p:sp>
+      <p:pic>
+        <p:nvPicPr>
+          <p:cNvPr id="14" name="Picture 13">
+            <a:extLst>
+              <a:ext uri="{FF2B5EF4-FFF2-40B4-BE49-F238E27FC236}">
+                <a16:creationId xmlns:a16="http://schemas.microsoft.com/office/drawing/2014/main" id="{E35D339A-C7FD-5D75-DD9C-7ADB386731D2}"/>
+              </a:ext>
+            </a:extLst>
+          </p:cNvPr>
+          <p:cNvPicPr>
+            <a:picLocks noChangeAspect="1"/>
+          </p:cNvPicPr>
+          <p:nvPr/>
+        </p:nvPicPr>
+        <p:blipFill>
+          <a:blip r:embed="rId3"/>
+          <a:stretch>
+            <a:fillRect/>
+          </a:stretch>
+        </p:blipFill>
+        <p:spPr>
+          <a:xfrm>
+            <a:off x="7400278" y="3946262"/>
+            <a:ext cx="3488923" cy="2779509"/>
+          </a:xfrm>
+          <a:prstGeom prst="rect">
+            <a:avLst/>
+          </a:prstGeom>
+        </p:spPr>
+      </p:pic>
+      <p:sp>
+        <p:nvSpPr>
+          <p:cNvPr id="16" name="TextBox 15">
+            <a:extLst>
+              <a:ext uri="{FF2B5EF4-FFF2-40B4-BE49-F238E27FC236}">
+                <a16:creationId xmlns:a16="http://schemas.microsoft.com/office/drawing/2014/main" id="{28B6FEEC-2F1C-2F6B-3486-5CD4F1EFEA1C}"/>
+              </a:ext>
+            </a:extLst>
+          </p:cNvPr>
+          <p:cNvSpPr txBox="1"/>
+          <p:nvPr/>
+        </p:nvSpPr>
+        <p:spPr>
+          <a:xfrm>
+            <a:off x="437225" y="5179954"/>
+            <a:ext cx="6094520" cy="646331"/>
+          </a:xfrm>
+          <a:prstGeom prst="rect">
+            <a:avLst/>
+          </a:prstGeom>
+          <a:noFill/>
+        </p:spPr>
+        <p:txBody>
+          <a:bodyPr wrap="square">
+            <a:spAutoFit/>
+          </a:bodyPr>
+          <a:lstStyle/>
+          <a:p>
+            <a:r>
+              <a:rPr lang="en-US" dirty="0">
+                <a:latin typeface="LiberationSerif"/>
+              </a:rPr>
+              <a:t>Common coupling also </a:t>
+            </a:r>
+            <a:r>
+              <a:rPr lang="en-US" sz="1800" b="0" i="0" u="none" strike="noStrike" baseline="0" dirty="0">
+                <a:latin typeface="LiberationSerif"/>
+              </a:rPr>
+              <a:t>potential sources of resource contention</a:t>
+            </a:r>
+            <a:endParaRPr lang="en-US" dirty="0"/>
+          </a:p>
+        </p:txBody>
+      </p:sp>
+      <p:sp>
+        <p:nvSpPr>
+          <p:cNvPr id="18" name="TextBox 17">
+            <a:extLst>
+              <a:ext uri="{FF2B5EF4-FFF2-40B4-BE49-F238E27FC236}">
+                <a16:creationId xmlns:a16="http://schemas.microsoft.com/office/drawing/2014/main" id="{66CD562D-5765-54B3-C5C7-43CAC519EB33}"/>
+              </a:ext>
+            </a:extLst>
+          </p:cNvPr>
+          <p:cNvSpPr txBox="1"/>
+          <p:nvPr/>
+        </p:nvSpPr>
+        <p:spPr>
+          <a:xfrm>
+            <a:off x="437225" y="5823726"/>
+            <a:ext cx="6094520" cy="646331"/>
+          </a:xfrm>
+          <a:prstGeom prst="rect">
+            <a:avLst/>
+          </a:prstGeom>
+          <a:noFill/>
+        </p:spPr>
+        <p:txBody>
+          <a:bodyPr wrap="square">
+            <a:spAutoFit/>
+          </a:bodyPr>
+          <a:lstStyle/>
+          <a:p>
+            <a:pPr algn="l"/>
+            <a:r>
+              <a:rPr lang="en-US" sz="1800" b="0" i="0" u="none" strike="noStrike" baseline="0" dirty="0">
+                <a:latin typeface="LiberationSerif"/>
+              </a:rPr>
+              <a:t>I’ve seen more than one database brought to its knees by an</a:t>
+            </a:r>
+          </a:p>
+          <a:p>
+            <a:pPr algn="l"/>
+            <a:r>
+              <a:rPr lang="en-US" sz="1800" b="0" i="0" u="none" strike="noStrike" baseline="0" dirty="0">
+                <a:latin typeface="LiberationSerif"/>
+              </a:rPr>
+              <a:t>expensive SQL query—</a:t>
+            </a:r>
+            <a:endParaRPr lang="en-US" dirty="0"/>
+          </a:p>
+        </p:txBody>
+      </p:sp>
+      <p:sp>
+        <p:nvSpPr>
+          <p:cNvPr id="20" name="TextBox 19">
+            <a:extLst>
+              <a:ext uri="{FF2B5EF4-FFF2-40B4-BE49-F238E27FC236}">
+                <a16:creationId xmlns:a16="http://schemas.microsoft.com/office/drawing/2014/main" id="{36374913-12D1-E57A-ACA4-E557B8F7AF23}"/>
+              </a:ext>
+            </a:extLst>
+          </p:cNvPr>
+          <p:cNvSpPr txBox="1"/>
+          <p:nvPr/>
+        </p:nvSpPr>
+        <p:spPr>
+          <a:xfrm>
+            <a:off x="437225" y="6470057"/>
+            <a:ext cx="6094520" cy="369332"/>
+          </a:xfrm>
+          <a:prstGeom prst="rect">
+            <a:avLst/>
+          </a:prstGeom>
+          <a:noFill/>
+        </p:spPr>
+        <p:txBody>
+          <a:bodyPr wrap="square">
+            <a:spAutoFit/>
+          </a:bodyPr>
+          <a:lstStyle/>
+          <a:p>
+            <a:r>
+              <a:rPr lang="en-US" sz="1800" b="0" i="0" u="none" strike="noStrike" baseline="0" dirty="0">
+                <a:latin typeface="LiberationSerif"/>
+              </a:rPr>
+              <a:t>common coupling is </a:t>
+            </a:r>
+            <a:r>
+              <a:rPr lang="en-US" sz="1800" b="0" i="1" u="none" strike="noStrike" baseline="0" dirty="0">
+                <a:latin typeface="LiberationSerif-Italic"/>
+              </a:rPr>
+              <a:t>sometimes </a:t>
+            </a:r>
+            <a:r>
+              <a:rPr lang="en-US" sz="1800" b="0" i="0" u="none" strike="noStrike" baseline="0" dirty="0">
+                <a:latin typeface="LiberationSerif"/>
+              </a:rPr>
+              <a:t>OK, but often it’s not</a:t>
+            </a:r>
+            <a:endParaRPr lang="en-US" dirty="0"/>
+          </a:p>
+        </p:txBody>
+      </p:sp>
+    </p:spTree>
+    <p:extLst>
+      <p:ext uri="{BB962C8B-B14F-4D97-AF65-F5344CB8AC3E}">
+        <p14:creationId xmlns:p14="http://schemas.microsoft.com/office/powerpoint/2010/main" val="3638142945"/>
+      </p:ext>
+    </p:extLst>
+  </p:cSld>
+  <p:clrMapOvr>
+    <a:masterClrMapping/>
+  </p:clrMapOvr>
+</p:sld>
+</file>
+
+<file path=ppt/slides/slide16.xml><?xml version="1.0" encoding="utf-8"?>
+<p:sld xmlns:a="http://schemas.openxmlformats.org/drawingml/2006/main" xmlns:r="http://schemas.openxmlformats.org/officeDocument/2006/relationships" xmlns:p="http://schemas.openxmlformats.org/presentationml/2006/main">
+  <p:cSld>
+    <p:spTree>
+      <p:nvGrpSpPr>
+        <p:cNvPr id="1" name=""/>
+        <p:cNvGrpSpPr/>
+        <p:nvPr/>
+      </p:nvGrpSpPr>
+      <p:grpSpPr>
+        <a:xfrm>
+          <a:off x="0" y="0"/>
+          <a:ext cx="0" cy="0"/>
+          <a:chOff x="0" y="0"/>
+          <a:chExt cx="0" cy="0"/>
+        </a:xfrm>
+      </p:grpSpPr>
+      <p:sp>
+        <p:nvSpPr>
+          <p:cNvPr id="5" name="TextBox 4">
+            <a:extLst>
+              <a:ext uri="{FF2B5EF4-FFF2-40B4-BE49-F238E27FC236}">
+                <a16:creationId xmlns:a16="http://schemas.microsoft.com/office/drawing/2014/main" id="{241D0A74-12AB-593B-074F-73C53930EE2C}"/>
+              </a:ext>
+            </a:extLst>
+          </p:cNvPr>
+          <p:cNvSpPr txBox="1"/>
+          <p:nvPr/>
+        </p:nvSpPr>
+        <p:spPr>
+          <a:xfrm>
+            <a:off x="543757" y="405698"/>
+            <a:ext cx="6094520" cy="369332"/>
+          </a:xfrm>
+          <a:prstGeom prst="rect">
+            <a:avLst/>
+          </a:prstGeom>
+          <a:noFill/>
+        </p:spPr>
+        <p:txBody>
+          <a:bodyPr wrap="square">
+            <a:spAutoFit/>
+          </a:bodyPr>
+          <a:lstStyle/>
+          <a:p>
+            <a:r>
+              <a:rPr lang="en-US" sz="1800" b="1" i="0" u="none" strike="noStrike" baseline="0" dirty="0">
+                <a:latin typeface="LiberationSans-Bold"/>
+              </a:rPr>
+              <a:t>Content Coupling</a:t>
+            </a:r>
+            <a:endParaRPr lang="en-US" dirty="0"/>
+          </a:p>
+        </p:txBody>
+      </p:sp>
+      <p:sp>
+        <p:nvSpPr>
+          <p:cNvPr id="7" name="TextBox 6">
+            <a:extLst>
+              <a:ext uri="{FF2B5EF4-FFF2-40B4-BE49-F238E27FC236}">
+                <a16:creationId xmlns:a16="http://schemas.microsoft.com/office/drawing/2014/main" id="{FC5B1631-6E1A-04F0-C2A7-020F64558B66}"/>
+              </a:ext>
+            </a:extLst>
+          </p:cNvPr>
+          <p:cNvSpPr txBox="1"/>
+          <p:nvPr/>
+        </p:nvSpPr>
+        <p:spPr>
+          <a:xfrm>
+            <a:off x="543757" y="775030"/>
+            <a:ext cx="6094520" cy="923330"/>
+          </a:xfrm>
+          <a:prstGeom prst="rect">
+            <a:avLst/>
+          </a:prstGeom>
+          <a:noFill/>
+        </p:spPr>
+        <p:txBody>
+          <a:bodyPr wrap="square">
+            <a:spAutoFit/>
+          </a:bodyPr>
+          <a:lstStyle/>
+          <a:p>
+            <a:pPr algn="l"/>
+            <a:r>
+              <a:rPr lang="en-US" sz="1800" b="0" i="0" u="none" strike="noStrike" baseline="0" dirty="0">
+                <a:latin typeface="LiberationSerif"/>
+              </a:rPr>
+              <a:t>an upstream service reaches into</a:t>
+            </a:r>
+          </a:p>
+          <a:p>
+            <a:pPr algn="l"/>
+            <a:r>
+              <a:rPr lang="en-US" sz="1800" b="0" i="0" u="none" strike="noStrike" baseline="0" dirty="0">
+                <a:latin typeface="LiberationSerif"/>
+              </a:rPr>
+              <a:t>the internals of a downstream service and changes its internal state.</a:t>
+            </a:r>
+            <a:endParaRPr lang="en-US" dirty="0"/>
+          </a:p>
+        </p:txBody>
+      </p:sp>
+      <p:pic>
+        <p:nvPicPr>
+          <p:cNvPr id="9" name="Picture 8">
+            <a:extLst>
+              <a:ext uri="{FF2B5EF4-FFF2-40B4-BE49-F238E27FC236}">
+                <a16:creationId xmlns:a16="http://schemas.microsoft.com/office/drawing/2014/main" id="{B5B88E62-C5F8-2FE7-B867-F4A00ABE6F44}"/>
+              </a:ext>
+            </a:extLst>
+          </p:cNvPr>
+          <p:cNvPicPr>
+            <a:picLocks noChangeAspect="1"/>
+          </p:cNvPicPr>
+          <p:nvPr/>
+        </p:nvPicPr>
+        <p:blipFill>
+          <a:blip r:embed="rId2"/>
+          <a:stretch>
+            <a:fillRect/>
+          </a:stretch>
+        </p:blipFill>
+        <p:spPr>
+          <a:xfrm>
+            <a:off x="6638277" y="2067692"/>
+            <a:ext cx="4072500" cy="3448050"/>
+          </a:xfrm>
+          <a:prstGeom prst="rect">
+            <a:avLst/>
+          </a:prstGeom>
+        </p:spPr>
+      </p:pic>
+      <p:sp>
+        <p:nvSpPr>
+          <p:cNvPr id="11" name="TextBox 10">
+            <a:extLst>
+              <a:ext uri="{FF2B5EF4-FFF2-40B4-BE49-F238E27FC236}">
+                <a16:creationId xmlns:a16="http://schemas.microsoft.com/office/drawing/2014/main" id="{807D65E4-1616-783C-0EF9-53155D30BC46}"/>
+              </a:ext>
+            </a:extLst>
+          </p:cNvPr>
+          <p:cNvSpPr txBox="1"/>
+          <p:nvPr/>
+        </p:nvSpPr>
+        <p:spPr>
+          <a:xfrm>
+            <a:off x="543757" y="2067692"/>
+            <a:ext cx="6096000" cy="646331"/>
+          </a:xfrm>
+          <a:prstGeom prst="rect">
+            <a:avLst/>
+          </a:prstGeom>
+          <a:noFill/>
+        </p:spPr>
+        <p:txBody>
+          <a:bodyPr wrap="square">
+            <a:spAutoFit/>
+          </a:bodyPr>
+          <a:lstStyle/>
+          <a:p>
+            <a:pPr algn="l"/>
+            <a:r>
+              <a:rPr lang="en-US" sz="1800" b="0" i="0" u="none" strike="noStrike" baseline="0" dirty="0">
+                <a:latin typeface="LiberationSerif"/>
+              </a:rPr>
+              <a:t>The easy fix here is to have the </a:t>
+            </a:r>
+            <a:r>
+              <a:rPr lang="en-US" sz="1800" b="0" i="0" u="none" strike="noStrike" baseline="0" dirty="0">
+                <a:latin typeface="UbuntuMono-Regular"/>
+              </a:rPr>
+              <a:t>Warehouse </a:t>
+            </a:r>
+            <a:r>
+              <a:rPr lang="en-US" sz="1800" b="0" i="0" u="none" strike="noStrike" baseline="0" dirty="0">
+                <a:latin typeface="LiberationSerif"/>
+              </a:rPr>
+              <a:t>send requests to</a:t>
+            </a:r>
+          </a:p>
+          <a:p>
+            <a:pPr algn="l"/>
+            <a:r>
+              <a:rPr lang="en-US" sz="1800" b="0" i="0" u="none" strike="noStrike" baseline="0" dirty="0">
+                <a:latin typeface="LiberationSerif"/>
+              </a:rPr>
+              <a:t>the </a:t>
+            </a:r>
+            <a:r>
+              <a:rPr lang="en-US" sz="1800" b="0" i="0" u="none" strike="noStrike" baseline="0" dirty="0">
+                <a:latin typeface="UbuntuMono-Regular"/>
+              </a:rPr>
+              <a:t>Order </a:t>
+            </a:r>
+            <a:r>
+              <a:rPr lang="en-US" sz="1800" b="0" i="0" u="none" strike="noStrike" baseline="0" dirty="0">
+                <a:latin typeface="LiberationSerif"/>
+              </a:rPr>
+              <a:t>service itself</a:t>
+            </a:r>
+            <a:endParaRPr lang="en-US" dirty="0"/>
+          </a:p>
+        </p:txBody>
+      </p:sp>
+      <p:sp>
+        <p:nvSpPr>
+          <p:cNvPr id="13" name="TextBox 12">
+            <a:extLst>
+              <a:ext uri="{FF2B5EF4-FFF2-40B4-BE49-F238E27FC236}">
+                <a16:creationId xmlns:a16="http://schemas.microsoft.com/office/drawing/2014/main" id="{A9B6A15B-50D7-AFC8-20AD-34F45E27C07B}"/>
+              </a:ext>
+            </a:extLst>
+          </p:cNvPr>
+          <p:cNvSpPr txBox="1"/>
+          <p:nvPr/>
+        </p:nvSpPr>
+        <p:spPr>
+          <a:xfrm>
+            <a:off x="543757" y="3083355"/>
+            <a:ext cx="6094520" cy="646331"/>
+          </a:xfrm>
+          <a:prstGeom prst="rect">
+            <a:avLst/>
+          </a:prstGeom>
+          <a:noFill/>
+        </p:spPr>
+        <p:txBody>
+          <a:bodyPr wrap="square">
+            <a:spAutoFit/>
+          </a:bodyPr>
+          <a:lstStyle/>
+          <a:p>
+            <a:pPr algn="l"/>
+            <a:r>
+              <a:rPr lang="en-US" sz="1800" b="0" i="0" u="none" strike="noStrike" baseline="0" dirty="0">
+                <a:latin typeface="LiberationSerif"/>
+              </a:rPr>
+              <a:t>people refer to it as </a:t>
+            </a:r>
+            <a:r>
+              <a:rPr lang="en-US" sz="1800" b="0" i="1" u="none" strike="noStrike" baseline="0" dirty="0">
+                <a:latin typeface="LiberationSerif-Italic"/>
+              </a:rPr>
+              <a:t>pathological</a:t>
+            </a:r>
+          </a:p>
+          <a:p>
+            <a:pPr algn="l"/>
+            <a:r>
+              <a:rPr lang="en-US" sz="1800" b="0" i="1" u="none" strike="noStrike" baseline="0" dirty="0">
+                <a:latin typeface="LiberationSerif-Italic"/>
+              </a:rPr>
+              <a:t>coupling</a:t>
+            </a:r>
+            <a:endParaRPr lang="en-US" dirty="0"/>
+          </a:p>
+        </p:txBody>
+      </p:sp>
+      <p:sp>
+        <p:nvSpPr>
+          <p:cNvPr id="15" name="TextBox 14">
+            <a:extLst>
+              <a:ext uri="{FF2B5EF4-FFF2-40B4-BE49-F238E27FC236}">
+                <a16:creationId xmlns:a16="http://schemas.microsoft.com/office/drawing/2014/main" id="{FB3DD455-53C2-B8F0-D49C-CDE727899369}"/>
+              </a:ext>
+            </a:extLst>
+          </p:cNvPr>
+          <p:cNvSpPr txBox="1"/>
+          <p:nvPr/>
+        </p:nvSpPr>
+        <p:spPr>
+          <a:xfrm>
+            <a:off x="543757" y="4099018"/>
+            <a:ext cx="6094520" cy="369332"/>
+          </a:xfrm>
+          <a:prstGeom prst="rect">
+            <a:avLst/>
+          </a:prstGeom>
+          <a:noFill/>
+        </p:spPr>
+        <p:txBody>
+          <a:bodyPr wrap="square">
+            <a:spAutoFit/>
+          </a:bodyPr>
+          <a:lstStyle/>
+          <a:p>
+            <a:r>
+              <a:rPr lang="en-US" sz="1800" b="0" i="0" u="none" strike="noStrike" baseline="0" dirty="0">
+                <a:latin typeface="LiberationSerif"/>
+              </a:rPr>
+              <a:t>In short, avoid content coupling.</a:t>
+            </a:r>
+            <a:endParaRPr lang="en-US" dirty="0"/>
+          </a:p>
+        </p:txBody>
+      </p:sp>
+    </p:spTree>
+    <p:extLst>
+      <p:ext uri="{BB962C8B-B14F-4D97-AF65-F5344CB8AC3E}">
+        <p14:creationId xmlns:p14="http://schemas.microsoft.com/office/powerpoint/2010/main" val="179310572"/>
+      </p:ext>
+    </p:extLst>
+  </p:cSld>
+  <p:clrMapOvr>
+    <a:masterClrMapping/>
+  </p:clrMapOvr>
+</p:sld>
+</file>
+
 <file path=ppt/slides/slide2.xml><?xml version="1.0" encoding="utf-8"?>
 <p:sld xmlns:a="http://schemas.openxmlformats.org/drawingml/2006/main" xmlns:r="http://schemas.openxmlformats.org/officeDocument/2006/relationships" xmlns:p="http://schemas.openxmlformats.org/presentationml/2006/main">
   <p:cSld>

</xml_diff>